<commit_message>
updated return types and parameters
</commit_message>
<xml_diff>
--- a/Overview.pptx
+++ b/Overview.pptx
@@ -6,6 +6,7 @@
   </p:sldMasterIdLst>
   <p:sldIdLst>
     <p:sldId id="256" r:id="rId2"/>
+    <p:sldId id="257" r:id="rId3"/>
   </p:sldIdLst>
   <p:sldSz cx="12192000" cy="6858000"/>
   <p:notesSz cx="6858000" cy="9144000"/>
@@ -104,6 +105,11 @@
       </a:defRPr>
     </a:lvl9pPr>
   </p:defaultTextStyle>
+  <p:extLst>
+    <p:ext uri="{EFAFB233-063F-42B5-8137-9DF3F51BA10A}">
+      <p15:sldGuideLst xmlns:p15="http://schemas.microsoft.com/office/powerpoint/2012/main"/>
+    </p:ext>
+  </p:extLst>
 </p:presentation>
 </file>
 
@@ -238,7 +244,7 @@
           <a:p>
             <a:fld id="{12698905-1562-4251-A802-78865E6E837A}" type="datetimeFigureOut">
               <a:rPr lang="en-GB" smtClean="0"/>
-              <a:t>21/08/2021</a:t>
+              <a:t>23/08/2021</a:t>
             </a:fld>
             <a:endParaRPr lang="en-GB"/>
           </a:p>
@@ -408,7 +414,7 @@
           <a:p>
             <a:fld id="{12698905-1562-4251-A802-78865E6E837A}" type="datetimeFigureOut">
               <a:rPr lang="en-GB" smtClean="0"/>
-              <a:t>21/08/2021</a:t>
+              <a:t>23/08/2021</a:t>
             </a:fld>
             <a:endParaRPr lang="en-GB"/>
           </a:p>
@@ -588,7 +594,7 @@
           <a:p>
             <a:fld id="{12698905-1562-4251-A802-78865E6E837A}" type="datetimeFigureOut">
               <a:rPr lang="en-GB" smtClean="0"/>
-              <a:t>21/08/2021</a:t>
+              <a:t>23/08/2021</a:t>
             </a:fld>
             <a:endParaRPr lang="en-GB"/>
           </a:p>
@@ -758,7 +764,7 @@
           <a:p>
             <a:fld id="{12698905-1562-4251-A802-78865E6E837A}" type="datetimeFigureOut">
               <a:rPr lang="en-GB" smtClean="0"/>
-              <a:t>21/08/2021</a:t>
+              <a:t>23/08/2021</a:t>
             </a:fld>
             <a:endParaRPr lang="en-GB"/>
           </a:p>
@@ -1004,7 +1010,7 @@
           <a:p>
             <a:fld id="{12698905-1562-4251-A802-78865E6E837A}" type="datetimeFigureOut">
               <a:rPr lang="en-GB" smtClean="0"/>
-              <a:t>21/08/2021</a:t>
+              <a:t>23/08/2021</a:t>
             </a:fld>
             <a:endParaRPr lang="en-GB"/>
           </a:p>
@@ -1236,7 +1242,7 @@
           <a:p>
             <a:fld id="{12698905-1562-4251-A802-78865E6E837A}" type="datetimeFigureOut">
               <a:rPr lang="en-GB" smtClean="0"/>
-              <a:t>21/08/2021</a:t>
+              <a:t>23/08/2021</a:t>
             </a:fld>
             <a:endParaRPr lang="en-GB"/>
           </a:p>
@@ -1603,7 +1609,7 @@
           <a:p>
             <a:fld id="{12698905-1562-4251-A802-78865E6E837A}" type="datetimeFigureOut">
               <a:rPr lang="en-GB" smtClean="0"/>
-              <a:t>21/08/2021</a:t>
+              <a:t>23/08/2021</a:t>
             </a:fld>
             <a:endParaRPr lang="en-GB"/>
           </a:p>
@@ -1721,7 +1727,7 @@
           <a:p>
             <a:fld id="{12698905-1562-4251-A802-78865E6E837A}" type="datetimeFigureOut">
               <a:rPr lang="en-GB" smtClean="0"/>
-              <a:t>21/08/2021</a:t>
+              <a:t>23/08/2021</a:t>
             </a:fld>
             <a:endParaRPr lang="en-GB"/>
           </a:p>
@@ -1816,7 +1822,7 @@
           <a:p>
             <a:fld id="{12698905-1562-4251-A802-78865E6E837A}" type="datetimeFigureOut">
               <a:rPr lang="en-GB" smtClean="0"/>
-              <a:t>21/08/2021</a:t>
+              <a:t>23/08/2021</a:t>
             </a:fld>
             <a:endParaRPr lang="en-GB"/>
           </a:p>
@@ -2093,7 +2099,7 @@
           <a:p>
             <a:fld id="{12698905-1562-4251-A802-78865E6E837A}" type="datetimeFigureOut">
               <a:rPr lang="en-GB" smtClean="0"/>
-              <a:t>21/08/2021</a:t>
+              <a:t>23/08/2021</a:t>
             </a:fld>
             <a:endParaRPr lang="en-GB"/>
           </a:p>
@@ -2346,7 +2352,7 @@
           <a:p>
             <a:fld id="{12698905-1562-4251-A802-78865E6E837A}" type="datetimeFigureOut">
               <a:rPr lang="en-GB" smtClean="0"/>
-              <a:t>21/08/2021</a:t>
+              <a:t>23/08/2021</a:t>
             </a:fld>
             <a:endParaRPr lang="en-GB"/>
           </a:p>
@@ -2559,7 +2565,7 @@
           <a:p>
             <a:fld id="{12698905-1562-4251-A802-78865E6E837A}" type="datetimeFigureOut">
               <a:rPr lang="en-GB" smtClean="0"/>
-              <a:t>21/08/2021</a:t>
+              <a:t>23/08/2021</a:t>
             </a:fld>
             <a:endParaRPr lang="en-GB"/>
           </a:p>
@@ -3597,6 +3603,426 @@
 </p:sld>
 </file>
 
+<file path=ppt/slides/slide2.xml><?xml version="1.0" encoding="utf-8"?>
+<p:sld xmlns:a="http://schemas.openxmlformats.org/drawingml/2006/main" xmlns:r="http://schemas.openxmlformats.org/officeDocument/2006/relationships" xmlns:p="http://schemas.openxmlformats.org/presentationml/2006/main">
+  <p:cSld>
+    <p:spTree>
+      <p:nvGrpSpPr>
+        <p:cNvPr id="1" name=""/>
+        <p:cNvGrpSpPr/>
+        <p:nvPr/>
+      </p:nvGrpSpPr>
+      <p:grpSpPr>
+        <a:xfrm>
+          <a:off x="0" y="0"/>
+          <a:ext cx="0" cy="0"/>
+          <a:chOff x="0" y="0"/>
+          <a:chExt cx="0" cy="0"/>
+        </a:xfrm>
+      </p:grpSpPr>
+      <p:sp>
+        <p:nvSpPr>
+          <p:cNvPr id="4" name="Rectangle 3"/>
+          <p:cNvSpPr/>
+          <p:nvPr/>
+        </p:nvSpPr>
+        <p:spPr>
+          <a:xfrm>
+            <a:off x="2484646" y="1412590"/>
+            <a:ext cx="3834173" cy="3386433"/>
+          </a:xfrm>
+          <a:prstGeom prst="rect">
+            <a:avLst/>
+          </a:prstGeom>
+        </p:spPr>
+        <p:style>
+          <a:lnRef idx="2">
+            <a:schemeClr val="accent1">
+              <a:shade val="50000"/>
+            </a:schemeClr>
+          </a:lnRef>
+          <a:fillRef idx="1">
+            <a:schemeClr val="accent1"/>
+          </a:fillRef>
+          <a:effectRef idx="0">
+            <a:schemeClr val="accent1"/>
+          </a:effectRef>
+          <a:fontRef idx="minor">
+            <a:schemeClr val="lt1"/>
+          </a:fontRef>
+        </p:style>
+        <p:txBody>
+          <a:bodyPr rtlCol="0" anchor="ctr"/>
+          <a:lstStyle/>
+          <a:p>
+            <a:pPr algn="ctr"/>
+            <a:r>
+              <a:rPr lang="de-DE" smtClean="0"/>
+              <a:t>Web page</a:t>
+            </a:r>
+            <a:endParaRPr lang="en-GB"/>
+          </a:p>
+        </p:txBody>
+      </p:sp>
+      <p:sp>
+        <p:nvSpPr>
+          <p:cNvPr id="5" name="Folded Corner 4"/>
+          <p:cNvSpPr/>
+          <p:nvPr/>
+        </p:nvSpPr>
+        <p:spPr>
+          <a:xfrm>
+            <a:off x="567559" y="3323371"/>
+            <a:ext cx="1084667" cy="958543"/>
+          </a:xfrm>
+          <a:prstGeom prst="foldedCorner">
+            <a:avLst/>
+          </a:prstGeom>
+        </p:spPr>
+        <p:style>
+          <a:lnRef idx="2">
+            <a:schemeClr val="accent1">
+              <a:shade val="50000"/>
+            </a:schemeClr>
+          </a:lnRef>
+          <a:fillRef idx="1">
+            <a:schemeClr val="accent1"/>
+          </a:fillRef>
+          <a:effectRef idx="0">
+            <a:schemeClr val="accent1"/>
+          </a:effectRef>
+          <a:fontRef idx="minor">
+            <a:schemeClr val="lt1"/>
+          </a:fontRef>
+        </p:style>
+        <p:txBody>
+          <a:bodyPr rtlCol="0" anchor="ctr"/>
+          <a:lstStyle/>
+          <a:p>
+            <a:pPr algn="ctr"/>
+            <a:r>
+              <a:rPr lang="de-DE" smtClean="0"/>
+              <a:t>cpp</a:t>
+            </a:r>
+            <a:endParaRPr lang="en-GB"/>
+          </a:p>
+        </p:txBody>
+      </p:sp>
+      <p:cxnSp>
+        <p:nvCxnSpPr>
+          <p:cNvPr id="7" name="Straight Arrow Connector 6"/>
+          <p:cNvCxnSpPr>
+            <a:stCxn id="5" idx="3"/>
+          </p:cNvCxnSpPr>
+          <p:nvPr/>
+        </p:nvCxnSpPr>
+        <p:spPr>
+          <a:xfrm flipV="1">
+            <a:off x="1652226" y="3279228"/>
+            <a:ext cx="832420" cy="523415"/>
+          </a:xfrm>
+          <a:prstGeom prst="straightConnector1">
+            <a:avLst/>
+          </a:prstGeom>
+          <a:ln>
+            <a:tailEnd type="triangle"/>
+          </a:ln>
+        </p:spPr>
+        <p:style>
+          <a:lnRef idx="1">
+            <a:schemeClr val="accent1"/>
+          </a:lnRef>
+          <a:fillRef idx="0">
+            <a:schemeClr val="accent1"/>
+          </a:fillRef>
+          <a:effectRef idx="0">
+            <a:schemeClr val="accent1"/>
+          </a:effectRef>
+          <a:fontRef idx="minor">
+            <a:schemeClr val="tx1"/>
+          </a:fontRef>
+        </p:style>
+      </p:cxnSp>
+      <p:sp>
+        <p:nvSpPr>
+          <p:cNvPr id="8" name="Folded Corner 7"/>
+          <p:cNvSpPr/>
+          <p:nvPr/>
+        </p:nvSpPr>
+        <p:spPr>
+          <a:xfrm>
+            <a:off x="7567448" y="2503564"/>
+            <a:ext cx="1254935" cy="1481959"/>
+          </a:xfrm>
+          <a:prstGeom prst="foldedCorner">
+            <a:avLst/>
+          </a:prstGeom>
+        </p:spPr>
+        <p:style>
+          <a:lnRef idx="2">
+            <a:schemeClr val="accent1">
+              <a:shade val="50000"/>
+            </a:schemeClr>
+          </a:lnRef>
+          <a:fillRef idx="1">
+            <a:schemeClr val="accent1"/>
+          </a:fillRef>
+          <a:effectRef idx="0">
+            <a:schemeClr val="accent1"/>
+          </a:effectRef>
+          <a:fontRef idx="minor">
+            <a:schemeClr val="lt1"/>
+          </a:fontRef>
+        </p:style>
+        <p:txBody>
+          <a:bodyPr rtlCol="0" anchor="ctr"/>
+          <a:lstStyle/>
+          <a:p>
+            <a:pPr algn="ctr"/>
+            <a:endParaRPr lang="en-GB"/>
+          </a:p>
+        </p:txBody>
+      </p:sp>
+      <p:sp>
+        <p:nvSpPr>
+          <p:cNvPr id="9" name="Folded Corner 8"/>
+          <p:cNvSpPr/>
+          <p:nvPr/>
+        </p:nvSpPr>
+        <p:spPr>
+          <a:xfrm>
+            <a:off x="8194915" y="3244543"/>
+            <a:ext cx="1254935" cy="1481959"/>
+          </a:xfrm>
+          <a:prstGeom prst="foldedCorner">
+            <a:avLst/>
+          </a:prstGeom>
+        </p:spPr>
+        <p:style>
+          <a:lnRef idx="2">
+            <a:schemeClr val="accent1">
+              <a:shade val="50000"/>
+            </a:schemeClr>
+          </a:lnRef>
+          <a:fillRef idx="1">
+            <a:schemeClr val="accent1"/>
+          </a:fillRef>
+          <a:effectRef idx="0">
+            <a:schemeClr val="accent1"/>
+          </a:effectRef>
+          <a:fontRef idx="minor">
+            <a:schemeClr val="lt1"/>
+          </a:fontRef>
+        </p:style>
+        <p:txBody>
+          <a:bodyPr rtlCol="0" anchor="ctr"/>
+          <a:lstStyle/>
+          <a:p>
+            <a:pPr algn="ctr"/>
+            <a:endParaRPr lang="en-GB"/>
+          </a:p>
+        </p:txBody>
+      </p:sp>
+      <p:sp>
+        <p:nvSpPr>
+          <p:cNvPr id="10" name="Folded Corner 9"/>
+          <p:cNvSpPr/>
+          <p:nvPr/>
+        </p:nvSpPr>
+        <p:spPr>
+          <a:xfrm>
+            <a:off x="8822382" y="4114800"/>
+            <a:ext cx="1254935" cy="1481959"/>
+          </a:xfrm>
+          <a:prstGeom prst="foldedCorner">
+            <a:avLst/>
+          </a:prstGeom>
+        </p:spPr>
+        <p:style>
+          <a:lnRef idx="2">
+            <a:schemeClr val="accent1">
+              <a:shade val="50000"/>
+            </a:schemeClr>
+          </a:lnRef>
+          <a:fillRef idx="1">
+            <a:schemeClr val="accent1"/>
+          </a:fillRef>
+          <a:effectRef idx="0">
+            <a:schemeClr val="accent1"/>
+          </a:effectRef>
+          <a:fontRef idx="minor">
+            <a:schemeClr val="lt1"/>
+          </a:fontRef>
+        </p:style>
+        <p:txBody>
+          <a:bodyPr rtlCol="0" anchor="ctr"/>
+          <a:lstStyle/>
+          <a:p>
+            <a:pPr algn="ctr"/>
+            <a:endParaRPr lang="en-GB"/>
+          </a:p>
+        </p:txBody>
+      </p:sp>
+      <p:sp>
+        <p:nvSpPr>
+          <p:cNvPr id="11" name="Folded Corner 10"/>
+          <p:cNvSpPr/>
+          <p:nvPr/>
+        </p:nvSpPr>
+        <p:spPr>
+          <a:xfrm>
+            <a:off x="9402553" y="4855779"/>
+            <a:ext cx="1254935" cy="1481959"/>
+          </a:xfrm>
+          <a:prstGeom prst="foldedCorner">
+            <a:avLst/>
+          </a:prstGeom>
+        </p:spPr>
+        <p:style>
+          <a:lnRef idx="2">
+            <a:schemeClr val="accent1">
+              <a:shade val="50000"/>
+            </a:schemeClr>
+          </a:lnRef>
+          <a:fillRef idx="1">
+            <a:schemeClr val="accent1"/>
+          </a:fillRef>
+          <a:effectRef idx="0">
+            <a:schemeClr val="accent1"/>
+          </a:effectRef>
+          <a:fontRef idx="minor">
+            <a:schemeClr val="lt1"/>
+          </a:fontRef>
+        </p:style>
+        <p:txBody>
+          <a:bodyPr rtlCol="0" anchor="ctr"/>
+          <a:lstStyle/>
+          <a:p>
+            <a:pPr algn="ctr"/>
+            <a:endParaRPr lang="en-GB"/>
+          </a:p>
+        </p:txBody>
+      </p:sp>
+      <p:sp>
+        <p:nvSpPr>
+          <p:cNvPr id="12" name="Rectangle 11"/>
+          <p:cNvSpPr/>
+          <p:nvPr/>
+        </p:nvSpPr>
+        <p:spPr>
+          <a:xfrm>
+            <a:off x="3317066" y="3626068"/>
+            <a:ext cx="2320684" cy="252248"/>
+          </a:xfrm>
+          <a:prstGeom prst="rect">
+            <a:avLst/>
+          </a:prstGeom>
+        </p:spPr>
+        <p:style>
+          <a:lnRef idx="2">
+            <a:schemeClr val="accent1">
+              <a:shade val="50000"/>
+            </a:schemeClr>
+          </a:lnRef>
+          <a:fillRef idx="1">
+            <a:schemeClr val="accent1"/>
+          </a:fillRef>
+          <a:effectRef idx="0">
+            <a:schemeClr val="accent1"/>
+          </a:effectRef>
+          <a:fontRef idx="minor">
+            <a:schemeClr val="lt1"/>
+          </a:fontRef>
+        </p:style>
+        <p:txBody>
+          <a:bodyPr rtlCol="0" anchor="ctr"/>
+          <a:lstStyle/>
+          <a:p>
+            <a:pPr algn="ctr"/>
+            <a:r>
+              <a:rPr lang="de-DE" smtClean="0"/>
+              <a:t>Download G-TestCases</a:t>
+            </a:r>
+            <a:endParaRPr lang="en-GB"/>
+          </a:p>
+        </p:txBody>
+      </p:sp>
+      <p:cxnSp>
+        <p:nvCxnSpPr>
+          <p:cNvPr id="14" name="Straight Arrow Connector 13"/>
+          <p:cNvCxnSpPr/>
+          <p:nvPr/>
+        </p:nvCxnSpPr>
+        <p:spPr>
+          <a:xfrm flipV="1">
+            <a:off x="5353970" y="3244543"/>
+            <a:ext cx="2137804" cy="444588"/>
+          </a:xfrm>
+          <a:prstGeom prst="straightConnector1">
+            <a:avLst/>
+          </a:prstGeom>
+          <a:ln>
+            <a:tailEnd type="triangle"/>
+          </a:ln>
+        </p:spPr>
+        <p:style>
+          <a:lnRef idx="1">
+            <a:schemeClr val="accent4"/>
+          </a:lnRef>
+          <a:fillRef idx="0">
+            <a:schemeClr val="accent4"/>
+          </a:fillRef>
+          <a:effectRef idx="0">
+            <a:schemeClr val="accent4"/>
+          </a:effectRef>
+          <a:fontRef idx="minor">
+            <a:schemeClr val="tx1"/>
+          </a:fontRef>
+        </p:style>
+      </p:cxnSp>
+      <p:sp>
+        <p:nvSpPr>
+          <p:cNvPr id="15" name="TextBox 14"/>
+          <p:cNvSpPr txBox="1"/>
+          <p:nvPr/>
+        </p:nvSpPr>
+        <p:spPr>
+          <a:xfrm>
+            <a:off x="2484646" y="2430625"/>
+            <a:ext cx="1822495" cy="369332"/>
+          </a:xfrm>
+          <a:prstGeom prst="rect">
+            <a:avLst/>
+          </a:prstGeom>
+          <a:noFill/>
+        </p:spPr>
+        <p:txBody>
+          <a:bodyPr wrap="square" rtlCol="0">
+            <a:spAutoFit/>
+          </a:bodyPr>
+          <a:lstStyle/>
+          <a:p>
+            <a:r>
+              <a:rPr lang="de-DE" smtClean="0"/>
+              <a:t>D&amp;D</a:t>
+            </a:r>
+            <a:endParaRPr lang="en-GB"/>
+          </a:p>
+        </p:txBody>
+      </p:sp>
+    </p:spTree>
+    <p:extLst>
+      <p:ext uri="{BB962C8B-B14F-4D97-AF65-F5344CB8AC3E}">
+        <p14:creationId xmlns:p14="http://schemas.microsoft.com/office/powerpoint/2010/main" val="901875237"/>
+      </p:ext>
+    </p:extLst>
+  </p:cSld>
+  <p:clrMapOvr>
+    <a:masterClrMapping/>
+  </p:clrMapOvr>
+</p:sld>
+</file>
+
 <file path=ppt/theme/theme1.xml><?xml version="1.0" encoding="utf-8"?>
 <a:theme xmlns:a="http://schemas.openxmlformats.org/drawingml/2006/main" name="Office Theme">
   <a:themeElements>

</xml_diff>